<commit_message>
Updated slides, added in Peer Review
</commit_message>
<xml_diff>
--- a/HCI Final Project.pptx
+++ b/HCI Final Project.pptx
@@ -5,11 +5,16 @@
     <p:sldMasterId id="2147483696" r:id="rId1"/>
   </p:sldMasterIdLst>
   <p:notesMasterIdLst>
-    <p:notesMasterId r:id="rId4"/>
+    <p:notesMasterId r:id="rId9"/>
   </p:notesMasterIdLst>
   <p:sldIdLst>
     <p:sldId id="256" r:id="rId2"/>
     <p:sldId id="257" r:id="rId3"/>
+    <p:sldId id="258" r:id="rId4"/>
+    <p:sldId id="259" r:id="rId5"/>
+    <p:sldId id="260" r:id="rId6"/>
+    <p:sldId id="261" r:id="rId7"/>
+    <p:sldId id="262" r:id="rId8"/>
   </p:sldIdLst>
   <p:sldSz cx="9144000" cy="6858000" type="screen4x3"/>
   <p:notesSz cx="6858000" cy="9144000"/>
@@ -3631,7 +3636,11 @@
           <a:bodyPr/>
           <a:lstStyle/>
           <a:p>
-            <a:endParaRPr lang="en-US"/>
+            <a:r>
+              <a:rPr lang="en-US" dirty="0" smtClean="0"/>
+              <a:t>Preschool Kids app	</a:t>
+            </a:r>
+            <a:endParaRPr lang="en-US" dirty="0"/>
           </a:p>
         </p:txBody>
       </p:sp>
@@ -3650,7 +3659,11 @@
           <a:bodyPr/>
           <a:lstStyle/>
           <a:p>
-            <a:endParaRPr lang="en-US"/>
+            <a:r>
+              <a:rPr lang="en-US" dirty="0" smtClean="0"/>
+              <a:t>Problems/Goals</a:t>
+            </a:r>
+            <a:endParaRPr lang="en-US" dirty="0"/>
           </a:p>
         </p:txBody>
       </p:sp>
@@ -3694,6 +3707,482 @@
       </p:par>
     </p:tnLst>
   </p:timing>
+</p:sld>
+</file>
+
+<file path=ppt/slides/slide3.xml><?xml version="1.0" encoding="utf-8"?>
+<p:sld xmlns:a="http://schemas.openxmlformats.org/drawingml/2006/main" xmlns:r="http://schemas.openxmlformats.org/officeDocument/2006/relationships" xmlns:p="http://schemas.openxmlformats.org/presentationml/2006/main">
+  <p:cSld>
+    <p:spTree>
+      <p:nvGrpSpPr>
+        <p:cNvPr id="1" name=""/>
+        <p:cNvGrpSpPr/>
+        <p:nvPr/>
+      </p:nvGrpSpPr>
+      <p:grpSpPr>
+        <a:xfrm>
+          <a:off x="0" y="0"/>
+          <a:ext cx="0" cy="0"/>
+          <a:chOff x="0" y="0"/>
+          <a:chExt cx="0" cy="0"/>
+        </a:xfrm>
+      </p:grpSpPr>
+      <p:sp>
+        <p:nvSpPr>
+          <p:cNvPr id="2" name="Title 1"/>
+          <p:cNvSpPr>
+            <a:spLocks noGrp="1"/>
+          </p:cNvSpPr>
+          <p:nvPr>
+            <p:ph type="title"/>
+          </p:nvPr>
+        </p:nvSpPr>
+        <p:spPr/>
+        <p:txBody>
+          <a:bodyPr/>
+          <a:lstStyle/>
+          <a:p>
+            <a:r>
+              <a:rPr lang="en-US" dirty="0" smtClean="0"/>
+              <a:t>Why is this needed?</a:t>
+            </a:r>
+            <a:endParaRPr lang="en-US" dirty="0"/>
+          </a:p>
+        </p:txBody>
+      </p:sp>
+      <p:sp>
+        <p:nvSpPr>
+          <p:cNvPr id="3" name="Content Placeholder 2"/>
+          <p:cNvSpPr>
+            <a:spLocks noGrp="1"/>
+          </p:cNvSpPr>
+          <p:nvPr>
+            <p:ph idx="1"/>
+          </p:nvPr>
+        </p:nvSpPr>
+        <p:spPr/>
+        <p:txBody>
+          <a:bodyPr/>
+          <a:lstStyle/>
+          <a:p>
+            <a:endParaRPr lang="en-US"/>
+          </a:p>
+        </p:txBody>
+      </p:sp>
+      <p:sp>
+        <p:nvSpPr>
+          <p:cNvPr id="4" name="Slide Number Placeholder 3"/>
+          <p:cNvSpPr>
+            <a:spLocks noGrp="1"/>
+          </p:cNvSpPr>
+          <p:nvPr>
+            <p:ph type="sldNum" sz="quarter" idx="12"/>
+          </p:nvPr>
+        </p:nvSpPr>
+        <p:spPr/>
+        <p:txBody>
+          <a:bodyPr/>
+          <a:lstStyle/>
+          <a:p>
+            <a:fld id="{C4CC9CB9-BE46-4084-843E-D521423E9188}" type="slidenum">
+              <a:rPr lang="en-US" smtClean="0"/>
+              <a:t>3</a:t>
+            </a:fld>
+            <a:endParaRPr lang="en-US"/>
+          </a:p>
+        </p:txBody>
+      </p:sp>
+    </p:spTree>
+    <p:extLst>
+      <p:ext uri="{BB962C8B-B14F-4D97-AF65-F5344CB8AC3E}">
+        <p14:creationId xmlns:p14="http://schemas.microsoft.com/office/powerpoint/2010/main" val="2791326687"/>
+      </p:ext>
+    </p:extLst>
+  </p:cSld>
+  <p:clrMapOvr>
+    <a:masterClrMapping/>
+  </p:clrMapOvr>
+</p:sld>
+</file>
+
+<file path=ppt/slides/slide4.xml><?xml version="1.0" encoding="utf-8"?>
+<p:sld xmlns:a="http://schemas.openxmlformats.org/drawingml/2006/main" xmlns:r="http://schemas.openxmlformats.org/officeDocument/2006/relationships" xmlns:p="http://schemas.openxmlformats.org/presentationml/2006/main">
+  <p:cSld>
+    <p:spTree>
+      <p:nvGrpSpPr>
+        <p:cNvPr id="1" name=""/>
+        <p:cNvGrpSpPr/>
+        <p:nvPr/>
+      </p:nvGrpSpPr>
+      <p:grpSpPr>
+        <a:xfrm>
+          <a:off x="0" y="0"/>
+          <a:ext cx="0" cy="0"/>
+          <a:chOff x="0" y="0"/>
+          <a:chExt cx="0" cy="0"/>
+        </a:xfrm>
+      </p:grpSpPr>
+      <p:sp>
+        <p:nvSpPr>
+          <p:cNvPr id="2" name="Title 1"/>
+          <p:cNvSpPr>
+            <a:spLocks noGrp="1"/>
+          </p:cNvSpPr>
+          <p:nvPr>
+            <p:ph type="title"/>
+          </p:nvPr>
+        </p:nvSpPr>
+        <p:spPr/>
+        <p:txBody>
+          <a:bodyPr/>
+          <a:lstStyle/>
+          <a:p>
+            <a:r>
+              <a:rPr lang="en-US" dirty="0" smtClean="0"/>
+              <a:t>Review/Revision Before</a:t>
+            </a:r>
+            <a:endParaRPr lang="en-US" dirty="0"/>
+          </a:p>
+        </p:txBody>
+      </p:sp>
+      <p:sp>
+        <p:nvSpPr>
+          <p:cNvPr id="3" name="Content Placeholder 2"/>
+          <p:cNvSpPr>
+            <a:spLocks noGrp="1"/>
+          </p:cNvSpPr>
+          <p:nvPr>
+            <p:ph idx="1"/>
+          </p:nvPr>
+        </p:nvSpPr>
+        <p:spPr/>
+        <p:txBody>
+          <a:bodyPr/>
+          <a:lstStyle/>
+          <a:p>
+            <a:endParaRPr lang="en-US"/>
+          </a:p>
+        </p:txBody>
+      </p:sp>
+      <p:sp>
+        <p:nvSpPr>
+          <p:cNvPr id="4" name="Slide Number Placeholder 3"/>
+          <p:cNvSpPr>
+            <a:spLocks noGrp="1"/>
+          </p:cNvSpPr>
+          <p:nvPr>
+            <p:ph type="sldNum" sz="quarter" idx="12"/>
+          </p:nvPr>
+        </p:nvSpPr>
+        <p:spPr/>
+        <p:txBody>
+          <a:bodyPr/>
+          <a:lstStyle/>
+          <a:p>
+            <a:fld id="{C4CC9CB9-BE46-4084-843E-D521423E9188}" type="slidenum">
+              <a:rPr lang="en-US" smtClean="0"/>
+              <a:t>4</a:t>
+            </a:fld>
+            <a:endParaRPr lang="en-US"/>
+          </a:p>
+        </p:txBody>
+      </p:sp>
+    </p:spTree>
+    <p:extLst>
+      <p:ext uri="{BB962C8B-B14F-4D97-AF65-F5344CB8AC3E}">
+        <p14:creationId xmlns:p14="http://schemas.microsoft.com/office/powerpoint/2010/main" val="2265807067"/>
+      </p:ext>
+    </p:extLst>
+  </p:cSld>
+  <p:clrMapOvr>
+    <a:masterClrMapping/>
+  </p:clrMapOvr>
+</p:sld>
+</file>
+
+<file path=ppt/slides/slide5.xml><?xml version="1.0" encoding="utf-8"?>
+<p:sld xmlns:a="http://schemas.openxmlformats.org/drawingml/2006/main" xmlns:r="http://schemas.openxmlformats.org/officeDocument/2006/relationships" xmlns:p="http://schemas.openxmlformats.org/presentationml/2006/main">
+  <p:cSld>
+    <p:spTree>
+      <p:nvGrpSpPr>
+        <p:cNvPr id="1" name=""/>
+        <p:cNvGrpSpPr/>
+        <p:nvPr/>
+      </p:nvGrpSpPr>
+      <p:grpSpPr>
+        <a:xfrm>
+          <a:off x="0" y="0"/>
+          <a:ext cx="0" cy="0"/>
+          <a:chOff x="0" y="0"/>
+          <a:chExt cx="0" cy="0"/>
+        </a:xfrm>
+      </p:grpSpPr>
+      <p:sp>
+        <p:nvSpPr>
+          <p:cNvPr id="2" name="Title 1"/>
+          <p:cNvSpPr>
+            <a:spLocks noGrp="1"/>
+          </p:cNvSpPr>
+          <p:nvPr>
+            <p:ph type="title"/>
+          </p:nvPr>
+        </p:nvSpPr>
+        <p:spPr/>
+        <p:txBody>
+          <a:bodyPr/>
+          <a:lstStyle/>
+          <a:p>
+            <a:r>
+              <a:rPr lang="en-US" dirty="0" smtClean="0"/>
+              <a:t>Review/Revision After</a:t>
+            </a:r>
+            <a:endParaRPr lang="en-US" dirty="0"/>
+          </a:p>
+        </p:txBody>
+      </p:sp>
+      <p:sp>
+        <p:nvSpPr>
+          <p:cNvPr id="3" name="Content Placeholder 2"/>
+          <p:cNvSpPr>
+            <a:spLocks noGrp="1"/>
+          </p:cNvSpPr>
+          <p:nvPr>
+            <p:ph idx="1"/>
+          </p:nvPr>
+        </p:nvSpPr>
+        <p:spPr/>
+        <p:txBody>
+          <a:bodyPr/>
+          <a:lstStyle/>
+          <a:p>
+            <a:endParaRPr lang="en-US"/>
+          </a:p>
+        </p:txBody>
+      </p:sp>
+      <p:sp>
+        <p:nvSpPr>
+          <p:cNvPr id="4" name="Slide Number Placeholder 3"/>
+          <p:cNvSpPr>
+            <a:spLocks noGrp="1"/>
+          </p:cNvSpPr>
+          <p:nvPr>
+            <p:ph type="sldNum" sz="quarter" idx="12"/>
+          </p:nvPr>
+        </p:nvSpPr>
+        <p:spPr/>
+        <p:txBody>
+          <a:bodyPr/>
+          <a:lstStyle/>
+          <a:p>
+            <a:fld id="{C4CC9CB9-BE46-4084-843E-D521423E9188}" type="slidenum">
+              <a:rPr lang="en-US" smtClean="0"/>
+              <a:t>5</a:t>
+            </a:fld>
+            <a:endParaRPr lang="en-US"/>
+          </a:p>
+        </p:txBody>
+      </p:sp>
+    </p:spTree>
+    <p:extLst>
+      <p:ext uri="{BB962C8B-B14F-4D97-AF65-F5344CB8AC3E}">
+        <p14:creationId xmlns:p14="http://schemas.microsoft.com/office/powerpoint/2010/main" val="4231169747"/>
+      </p:ext>
+    </p:extLst>
+  </p:cSld>
+  <p:clrMapOvr>
+    <a:masterClrMapping/>
+  </p:clrMapOvr>
+</p:sld>
+</file>
+
+<file path=ppt/slides/slide6.xml><?xml version="1.0" encoding="utf-8"?>
+<p:sld xmlns:a="http://schemas.openxmlformats.org/drawingml/2006/main" xmlns:r="http://schemas.openxmlformats.org/officeDocument/2006/relationships" xmlns:p="http://schemas.openxmlformats.org/presentationml/2006/main">
+  <p:cSld>
+    <p:spTree>
+      <p:nvGrpSpPr>
+        <p:cNvPr id="1" name=""/>
+        <p:cNvGrpSpPr/>
+        <p:nvPr/>
+      </p:nvGrpSpPr>
+      <p:grpSpPr>
+        <a:xfrm>
+          <a:off x="0" y="0"/>
+          <a:ext cx="0" cy="0"/>
+          <a:chOff x="0" y="0"/>
+          <a:chExt cx="0" cy="0"/>
+        </a:xfrm>
+      </p:grpSpPr>
+      <p:sp>
+        <p:nvSpPr>
+          <p:cNvPr id="2" name="Title 1"/>
+          <p:cNvSpPr>
+            <a:spLocks noGrp="1"/>
+          </p:cNvSpPr>
+          <p:nvPr>
+            <p:ph type="title"/>
+          </p:nvPr>
+        </p:nvSpPr>
+        <p:spPr/>
+        <p:txBody>
+          <a:bodyPr/>
+          <a:lstStyle/>
+          <a:p>
+            <a:r>
+              <a:rPr lang="en-US" dirty="0" smtClean="0"/>
+              <a:t>Design Successes</a:t>
+            </a:r>
+            <a:endParaRPr lang="en-US" dirty="0"/>
+          </a:p>
+        </p:txBody>
+      </p:sp>
+      <p:sp>
+        <p:nvSpPr>
+          <p:cNvPr id="3" name="Content Placeholder 2"/>
+          <p:cNvSpPr>
+            <a:spLocks noGrp="1"/>
+          </p:cNvSpPr>
+          <p:nvPr>
+            <p:ph idx="1"/>
+          </p:nvPr>
+        </p:nvSpPr>
+        <p:spPr/>
+        <p:txBody>
+          <a:bodyPr/>
+          <a:lstStyle/>
+          <a:p>
+            <a:endParaRPr lang="en-US"/>
+          </a:p>
+        </p:txBody>
+      </p:sp>
+      <p:sp>
+        <p:nvSpPr>
+          <p:cNvPr id="4" name="Slide Number Placeholder 3"/>
+          <p:cNvSpPr>
+            <a:spLocks noGrp="1"/>
+          </p:cNvSpPr>
+          <p:nvPr>
+            <p:ph type="sldNum" sz="quarter" idx="12"/>
+          </p:nvPr>
+        </p:nvSpPr>
+        <p:spPr/>
+        <p:txBody>
+          <a:bodyPr/>
+          <a:lstStyle/>
+          <a:p>
+            <a:fld id="{C4CC9CB9-BE46-4084-843E-D521423E9188}" type="slidenum">
+              <a:rPr lang="en-US" smtClean="0"/>
+              <a:t>6</a:t>
+            </a:fld>
+            <a:endParaRPr lang="en-US"/>
+          </a:p>
+        </p:txBody>
+      </p:sp>
+    </p:spTree>
+    <p:extLst>
+      <p:ext uri="{BB962C8B-B14F-4D97-AF65-F5344CB8AC3E}">
+        <p14:creationId xmlns:p14="http://schemas.microsoft.com/office/powerpoint/2010/main" val="844686482"/>
+      </p:ext>
+    </p:extLst>
+  </p:cSld>
+  <p:clrMapOvr>
+    <a:masterClrMapping/>
+  </p:clrMapOvr>
+</p:sld>
+</file>
+
+<file path=ppt/slides/slide7.xml><?xml version="1.0" encoding="utf-8"?>
+<p:sld xmlns:a="http://schemas.openxmlformats.org/drawingml/2006/main" xmlns:r="http://schemas.openxmlformats.org/officeDocument/2006/relationships" xmlns:p="http://schemas.openxmlformats.org/presentationml/2006/main">
+  <p:cSld>
+    <p:spTree>
+      <p:nvGrpSpPr>
+        <p:cNvPr id="1" name=""/>
+        <p:cNvGrpSpPr/>
+        <p:nvPr/>
+      </p:nvGrpSpPr>
+      <p:grpSpPr>
+        <a:xfrm>
+          <a:off x="0" y="0"/>
+          <a:ext cx="0" cy="0"/>
+          <a:chOff x="0" y="0"/>
+          <a:chExt cx="0" cy="0"/>
+        </a:xfrm>
+      </p:grpSpPr>
+      <p:sp>
+        <p:nvSpPr>
+          <p:cNvPr id="2" name="Title 1"/>
+          <p:cNvSpPr>
+            <a:spLocks noGrp="1"/>
+          </p:cNvSpPr>
+          <p:nvPr>
+            <p:ph type="title"/>
+          </p:nvPr>
+        </p:nvSpPr>
+        <p:spPr/>
+        <p:txBody>
+          <a:bodyPr/>
+          <a:lstStyle/>
+          <a:p>
+            <a:pPr algn="ctr"/>
+            <a:r>
+              <a:rPr lang="en-US" dirty="0" smtClean="0"/>
+              <a:t>Questions?</a:t>
+            </a:r>
+            <a:endParaRPr lang="en-US" dirty="0"/>
+          </a:p>
+        </p:txBody>
+      </p:sp>
+      <p:sp>
+        <p:nvSpPr>
+          <p:cNvPr id="3" name="Content Placeholder 2"/>
+          <p:cNvSpPr>
+            <a:spLocks noGrp="1"/>
+          </p:cNvSpPr>
+          <p:nvPr>
+            <p:ph idx="1"/>
+          </p:nvPr>
+        </p:nvSpPr>
+        <p:spPr/>
+        <p:txBody>
+          <a:bodyPr/>
+          <a:lstStyle/>
+          <a:p>
+            <a:endParaRPr lang="en-US"/>
+          </a:p>
+        </p:txBody>
+      </p:sp>
+      <p:sp>
+        <p:nvSpPr>
+          <p:cNvPr id="4" name="Slide Number Placeholder 3"/>
+          <p:cNvSpPr>
+            <a:spLocks noGrp="1"/>
+          </p:cNvSpPr>
+          <p:nvPr>
+            <p:ph type="sldNum" sz="quarter" idx="12"/>
+          </p:nvPr>
+        </p:nvSpPr>
+        <p:spPr/>
+        <p:txBody>
+          <a:bodyPr/>
+          <a:lstStyle/>
+          <a:p>
+            <a:fld id="{C4CC9CB9-BE46-4084-843E-D521423E9188}" type="slidenum">
+              <a:rPr lang="en-US" smtClean="0"/>
+              <a:t>7</a:t>
+            </a:fld>
+            <a:endParaRPr lang="en-US"/>
+          </a:p>
+        </p:txBody>
+      </p:sp>
+    </p:spTree>
+    <p:extLst>
+      <p:ext uri="{BB962C8B-B14F-4D97-AF65-F5344CB8AC3E}">
+        <p14:creationId xmlns:p14="http://schemas.microsoft.com/office/powerpoint/2010/main" val="709301335"/>
+      </p:ext>
+    </p:extLst>
+  </p:cSld>
+  <p:clrMapOvr>
+    <a:masterClrMapping/>
+  </p:clrMapOvr>
 </p:sld>
 </file>
 

</xml_diff>